<commit_message>
editing presentation and acceptance tests
</commit_message>
<xml_diff>
--- a/docs/presentation.pptx
+++ b/docs/presentation.pptx
@@ -120,7 +120,7 @@
   <pc:docChgLst>
     <pc:chgData name="Viktoria Elena Pernkopf" userId="6368a6be5aca3f60" providerId="LiveId" clId="{046950FF-122A-447C-B9E5-2E7177266AAA}"/>
     <pc:docChg chg="undo custSel addSld modSld">
-      <pc:chgData name="Viktoria Elena Pernkopf" userId="6368a6be5aca3f60" providerId="LiveId" clId="{046950FF-122A-447C-B9E5-2E7177266AAA}" dt="2026-02-05T20:19:42.830" v="831" actId="1076"/>
+      <pc:chgData name="Viktoria Elena Pernkopf" userId="6368a6be5aca3f60" providerId="LiveId" clId="{046950FF-122A-447C-B9E5-2E7177266AAA}" dt="2026-02-05T20:46:38.480" v="911" actId="20577"/>
       <pc:docMkLst>
         <pc:docMk/>
       </pc:docMkLst>
@@ -140,7 +140,7 @@
         </pc:spChg>
       </pc:sldChg>
       <pc:sldChg chg="modSp new mod">
-        <pc:chgData name="Viktoria Elena Pernkopf" userId="6368a6be5aca3f60" providerId="LiveId" clId="{046950FF-122A-447C-B9E5-2E7177266AAA}" dt="2026-02-05T20:16:15.101" v="523" actId="20577"/>
+        <pc:chgData name="Viktoria Elena Pernkopf" userId="6368a6be5aca3f60" providerId="LiveId" clId="{046950FF-122A-447C-B9E5-2E7177266AAA}" dt="2026-02-05T20:46:38.480" v="911" actId="20577"/>
         <pc:sldMkLst>
           <pc:docMk/>
           <pc:sldMk cId="2714509053" sldId="257"/>
@@ -154,7 +154,7 @@
           </ac:spMkLst>
         </pc:spChg>
         <pc:spChg chg="mod">
-          <ac:chgData name="Viktoria Elena Pernkopf" userId="6368a6be5aca3f60" providerId="LiveId" clId="{046950FF-122A-447C-B9E5-2E7177266AAA}" dt="2026-02-05T20:16:15.101" v="523" actId="20577"/>
+          <ac:chgData name="Viktoria Elena Pernkopf" userId="6368a6be5aca3f60" providerId="LiveId" clId="{046950FF-122A-447C-B9E5-2E7177266AAA}" dt="2026-02-05T20:46:38.480" v="911" actId="20577"/>
           <ac:spMkLst>
             <pc:docMk/>
             <pc:sldMk cId="2714509053" sldId="257"/>
@@ -163,7 +163,7 @@
         </pc:spChg>
       </pc:sldChg>
       <pc:sldChg chg="modSp new mod">
-        <pc:chgData name="Viktoria Elena Pernkopf" userId="6368a6be5aca3f60" providerId="LiveId" clId="{046950FF-122A-447C-B9E5-2E7177266AAA}" dt="2026-02-05T20:18:51.338" v="792" actId="20577"/>
+        <pc:chgData name="Viktoria Elena Pernkopf" userId="6368a6be5aca3f60" providerId="LiveId" clId="{046950FF-122A-447C-B9E5-2E7177266AAA}" dt="2026-02-05T20:45:59.349" v="862" actId="20577"/>
         <pc:sldMkLst>
           <pc:docMk/>
           <pc:sldMk cId="3508669570" sldId="258"/>
@@ -177,7 +177,7 @@
           </ac:spMkLst>
         </pc:spChg>
         <pc:spChg chg="mod">
-          <ac:chgData name="Viktoria Elena Pernkopf" userId="6368a6be5aca3f60" providerId="LiveId" clId="{046950FF-122A-447C-B9E5-2E7177266AAA}" dt="2026-02-05T20:18:51.338" v="792" actId="20577"/>
+          <ac:chgData name="Viktoria Elena Pernkopf" userId="6368a6be5aca3f60" providerId="LiveId" clId="{046950FF-122A-447C-B9E5-2E7177266AAA}" dt="2026-02-05T20:45:59.349" v="862" actId="20577"/>
           <ac:spMkLst>
             <pc:docMk/>
             <pc:sldMk cId="3508669570" sldId="258"/>
@@ -258,6 +258,7 @@
               <a:rPr lang="en-US"/>
               <a:t>Click to edit Master title style</a:t>
             </a:r>
+            <a:endParaRPr lang="en-US" dirty="0"/>
           </a:p>
         </p:txBody>
       </p:sp>
@@ -322,6 +323,7 @@
               <a:rPr lang="en-US"/>
               <a:t>Click to edit Master subtitle style</a:t>
             </a:r>
+            <a:endParaRPr lang="en-US" dirty="0"/>
           </a:p>
         </p:txBody>
       </p:sp>
@@ -439,6 +441,7 @@
               <a:rPr lang="en-US"/>
               <a:t>Click to edit Master title style</a:t>
             </a:r>
+            <a:endParaRPr lang="en-US" dirty="0"/>
           </a:p>
         </p:txBody>
       </p:sp>
@@ -490,6 +493,7 @@
               <a:rPr lang="en-US"/>
               <a:t>Fifth level</a:t>
             </a:r>
+            <a:endParaRPr lang="en-US" dirty="0"/>
           </a:p>
         </p:txBody>
       </p:sp>
@@ -612,6 +616,7 @@
               <a:rPr lang="en-US"/>
               <a:t>Click to edit Master title style</a:t>
             </a:r>
+            <a:endParaRPr lang="en-US" dirty="0"/>
           </a:p>
         </p:txBody>
       </p:sp>
@@ -668,6 +673,7 @@
               <a:rPr lang="en-US"/>
               <a:t>Fifth level</a:t>
             </a:r>
+            <a:endParaRPr lang="en-US" dirty="0"/>
           </a:p>
         </p:txBody>
       </p:sp>
@@ -785,6 +791,7 @@
               <a:rPr lang="en-US"/>
               <a:t>Click to edit Master title style</a:t>
             </a:r>
+            <a:endParaRPr lang="en-US" dirty="0"/>
           </a:p>
         </p:txBody>
       </p:sp>
@@ -836,6 +843,7 @@
               <a:rPr lang="en-US"/>
               <a:t>Fifth level</a:t>
             </a:r>
+            <a:endParaRPr lang="en-US" dirty="0"/>
           </a:p>
         </p:txBody>
       </p:sp>
@@ -962,6 +970,7 @@
               <a:rPr lang="en-US"/>
               <a:t>Click to edit Master title style</a:t>
             </a:r>
+            <a:endParaRPr lang="en-US" dirty="0"/>
           </a:p>
         </p:txBody>
       </p:sp>
@@ -1198,6 +1207,7 @@
               <a:rPr lang="en-US"/>
               <a:t>Click to edit Master title style</a:t>
             </a:r>
+            <a:endParaRPr lang="en-US" dirty="0"/>
           </a:p>
         </p:txBody>
       </p:sp>
@@ -1254,6 +1264,7 @@
               <a:rPr lang="en-US"/>
               <a:t>Fifth level</a:t>
             </a:r>
+            <a:endParaRPr lang="en-US" dirty="0"/>
           </a:p>
         </p:txBody>
       </p:sp>
@@ -1310,6 +1321,7 @@
               <a:rPr lang="en-US"/>
               <a:t>Fifth level</a:t>
             </a:r>
+            <a:endParaRPr lang="en-US" dirty="0"/>
           </a:p>
         </p:txBody>
       </p:sp>
@@ -1432,6 +1444,7 @@
               <a:rPr lang="en-US"/>
               <a:t>Click to edit Master title style</a:t>
             </a:r>
+            <a:endParaRPr lang="en-US" dirty="0"/>
           </a:p>
         </p:txBody>
       </p:sp>
@@ -1553,6 +1566,7 @@
               <a:rPr lang="en-US"/>
               <a:t>Fifth level</a:t>
             </a:r>
+            <a:endParaRPr lang="en-US" dirty="0"/>
           </a:p>
         </p:txBody>
       </p:sp>
@@ -1674,6 +1688,7 @@
               <a:rPr lang="en-US"/>
               <a:t>Fifth level</a:t>
             </a:r>
+            <a:endParaRPr lang="en-US" dirty="0"/>
           </a:p>
         </p:txBody>
       </p:sp>
@@ -1791,6 +1806,7 @@
               <a:rPr lang="en-US"/>
               <a:t>Click to edit Master title style</a:t>
             </a:r>
+            <a:endParaRPr lang="en-US" dirty="0"/>
           </a:p>
         </p:txBody>
       </p:sp>
@@ -2012,6 +2028,7 @@
               <a:rPr lang="en-US"/>
               <a:t>Click to edit Master title style</a:t>
             </a:r>
+            <a:endParaRPr lang="en-US" dirty="0"/>
           </a:p>
         </p:txBody>
       </p:sp>
@@ -2096,6 +2113,7 @@
               <a:rPr lang="en-US"/>
               <a:t>Fifth level</a:t>
             </a:r>
+            <a:endParaRPr lang="en-US" dirty="0"/>
           </a:p>
         </p:txBody>
       </p:sp>
@@ -2287,6 +2305,7 @@
               <a:rPr lang="en-US"/>
               <a:t>Click to edit Master title style</a:t>
             </a:r>
+            <a:endParaRPr lang="en-US" dirty="0"/>
           </a:p>
         </p:txBody>
       </p:sp>
@@ -2351,6 +2370,7 @@
               <a:rPr lang="en-US"/>
               <a:t>Click icon to add picture</a:t>
             </a:r>
+            <a:endParaRPr lang="en-US" dirty="0"/>
           </a:p>
         </p:txBody>
       </p:sp>
@@ -2548,6 +2568,7 @@
               <a:rPr lang="en-US"/>
               <a:t>Click to edit Master title style</a:t>
             </a:r>
+            <a:endParaRPr lang="en-US" dirty="0"/>
           </a:p>
         </p:txBody>
       </p:sp>
@@ -2609,6 +2630,7 @@
               <a:rPr lang="en-US"/>
               <a:t>Fifth level</a:t>
             </a:r>
+            <a:endParaRPr lang="en-US" dirty="0"/>
           </a:p>
         </p:txBody>
       </p:sp>
@@ -3074,7 +3096,7 @@
           <a:lstStyle/>
           <a:p>
             <a:r>
-              <a:rPr lang="en-US"/>
+              <a:rPr lang="en-US" dirty="0"/>
               <a:t>RoomFood</a:t>
             </a:r>
           </a:p>
@@ -3107,7 +3129,7 @@
           <a:lstStyle/>
           <a:p>
             <a:r>
-              <a:rPr lang="en-US"/>
+              <a:rPr lang="en-US" dirty="0"/>
               <a:t>Antonio Petrov, Audrey Wimmer, Ostap Malanyak, Viktoria Pernkopf</a:t>
             </a:r>
           </a:p>
@@ -3165,7 +3187,7 @@
           <a:lstStyle/>
           <a:p>
             <a:r>
-              <a:rPr lang="en-US"/>
+              <a:rPr lang="en-US" dirty="0"/>
               <a:t>Basic idea</a:t>
             </a:r>
           </a:p>
@@ -3193,43 +3215,49 @@
           <a:lstStyle/>
           <a:p>
             <a:r>
-              <a:rPr lang="en-US"/>
+              <a:rPr lang="en-US" dirty="0"/>
               <a:t>Website for planning meals in shared households</a:t>
             </a:r>
           </a:p>
           <a:p>
             <a:r>
-              <a:rPr lang="en-US"/>
+              <a:rPr lang="en-US" dirty="0"/>
               <a:t>Schedule meal plans with recipes and ingredients</a:t>
             </a:r>
           </a:p>
           <a:p>
             <a:r>
-              <a:rPr lang="en-US"/>
+              <a:rPr lang="en-US" dirty="0"/>
               <a:t>A user can join rooms</a:t>
             </a:r>
           </a:p>
           <a:p>
             <a:r>
-              <a:rPr lang="en-US"/>
+              <a:rPr lang="en-US" dirty="0"/>
+              <a:t>A room has an owner who manages it</a:t>
+            </a:r>
+          </a:p>
+          <a:p>
+            <a:r>
+              <a:rPr lang="en-US" dirty="0"/>
               <a:t>Meal plans are shared in a room</a:t>
             </a:r>
           </a:p>
           <a:p>
             <a:r>
-              <a:rPr lang="en-US"/>
+              <a:rPr lang="en-US" dirty="0"/>
               <a:t>Users can assign meals and ingredients to each other</a:t>
             </a:r>
           </a:p>
           <a:p>
             <a:r>
-              <a:rPr lang="en-US"/>
+              <a:rPr lang="en-US" dirty="0"/>
               <a:t>Users can share recipes</a:t>
             </a:r>
           </a:p>
           <a:p>
             <a:r>
-              <a:rPr lang="en-US"/>
+              <a:rPr lang="en-US" dirty="0"/>
               <a:t>Users have an overview of planned meals</a:t>
             </a:r>
           </a:p>
@@ -3287,7 +3315,7 @@
           <a:lstStyle/>
           <a:p>
             <a:r>
-              <a:rPr lang="en-US"/>
+              <a:rPr lang="en-US" dirty="0"/>
               <a:t>Plans for sprint 1</a:t>
             </a:r>
           </a:p>
@@ -3315,31 +3343,31 @@
           <a:lstStyle/>
           <a:p>
             <a:r>
-              <a:rPr lang="en-US"/>
+              <a:rPr lang="en-US" dirty="0"/>
               <a:t>Basic login functionality</a:t>
             </a:r>
           </a:p>
           <a:p>
             <a:r>
-              <a:rPr lang="en-US"/>
-              <a:t>Only planning per user, no rooms</a:t>
-            </a:r>
-          </a:p>
-          <a:p>
-            <a:r>
-              <a:rPr lang="en-US"/>
+              <a:rPr lang="en-US" dirty="0"/>
+              <a:t>Only planning for user themselves, no rooms</a:t>
+            </a:r>
+          </a:p>
+          <a:p>
+            <a:r>
+              <a:rPr lang="en-US" dirty="0"/>
               <a:t>Adding meals to your own meal plan</a:t>
             </a:r>
           </a:p>
           <a:p>
             <a:r>
-              <a:rPr lang="en-US"/>
+              <a:rPr lang="en-US" dirty="0"/>
               <a:t>Overview of planned meals</a:t>
             </a:r>
           </a:p>
           <a:p>
             <a:r>
-              <a:rPr lang="en-US"/>
+              <a:rPr lang="en-US" dirty="0"/>
               <a:t>Storing login info and meals in the database</a:t>
             </a:r>
           </a:p>
@@ -3403,7 +3431,7 @@
           <a:p>
             <a:pPr algn="ctr"/>
             <a:r>
-              <a:rPr lang="en-US"/>
+              <a:rPr lang="en-US" dirty="0"/>
               <a:t>Thank you for your attention.</a:t>
             </a:r>
           </a:p>

</xml_diff>